<commit_message>
updated slides and logo
</commit_message>
<xml_diff>
--- a/assets/presentation/ChatAVR.pptx
+++ b/assets/presentation/ChatAVR.pptx
@@ -515,13 +515,8 @@
           <a:p>
             <a:r>
               <a:rPr lang="en-US" dirty="0"/>
-              <a:t>Why did we choose the </a:t>
-            </a:r>
-            <a:r>
-              <a:rPr lang="en-US"/>
-              <a:t>challenge?</a:t>
-            </a:r>
-            <a:endParaRPr lang="en-US" dirty="0"/>
+              <a:t>Why did we choose the challenge?</a:t>
+            </a:r>
           </a:p>
         </p:txBody>
       </p:sp>
@@ -3483,7 +3478,7 @@
           <a:p>
             <a:r>
               <a:rPr lang="en-US" dirty="0"/>
-              <a:t>ChatAVR</a:t>
+              <a:t>NAVBÄR</a:t>
             </a:r>
           </a:p>
         </p:txBody>
@@ -4189,45 +4184,43 @@
           <a:p>
             <a:r>
               <a:rPr lang="en-US" dirty="0"/>
-              <a:t>What are we offering?</a:t>
+              <a:t>What are we offering from PAX?</a:t>
             </a:r>
           </a:p>
           <a:p>
             <a:pPr lvl="1"/>
             <a:r>
               <a:rPr lang="en-US" dirty="0"/>
-              <a:t>PAX disability insurance</a:t>
+              <a:t>disability insurance</a:t>
             </a:r>
           </a:p>
           <a:p>
             <a:pPr lvl="1"/>
             <a:r>
               <a:rPr lang="en-US" dirty="0"/>
-              <a:t>PAX life insurance</a:t>
+              <a:t>life insurance</a:t>
             </a:r>
           </a:p>
           <a:p>
             <a:pPr lvl="1"/>
             <a:r>
               <a:rPr lang="en-US" dirty="0"/>
-              <a:t>PAX savings life insurance</a:t>
-            </a:r>
-          </a:p>
-          <a:p>
+              <a:t>savings life insurance</a:t>
+            </a:r>
+          </a:p>
+          <a:p>
+            <a:pPr lvl="1"/>
             <a:r>
               <a:rPr lang="en-US" dirty="0"/>
-              <a:t>TRY IT OUT NOW </a:t>
-            </a:r>
-            <a:r>
-              <a:rPr lang="en-US" dirty="0">
-                <a:sym typeface="Wingdings" panose="05000000000000000000" pitchFamily="2" charset="2"/>
-              </a:rPr>
-              <a:t></a:t>
-            </a:r>
-            <a:endParaRPr lang="en-US" dirty="0"/>
-          </a:p>
-          <a:p>
-            <a:endParaRPr lang="en-US" dirty="0"/>
+              <a:t>children's insurance</a:t>
+            </a:r>
+          </a:p>
+          <a:p>
+            <a:pPr lvl="1"/>
+            <a:r>
+              <a:rPr lang="en-US" dirty="0"/>
+              <a:t>payout plan</a:t>
+            </a:r>
           </a:p>
         </p:txBody>
       </p:sp>
@@ -4314,6 +4307,52 @@
           </a:p>
         </p:txBody>
       </p:sp>
+      <p:sp>
+        <p:nvSpPr>
+          <p:cNvPr id="5" name="TextBox 4">
+            <a:extLst>
+              <a:ext uri="{FF2B5EF4-FFF2-40B4-BE49-F238E27FC236}">
+                <a16:creationId xmlns:a16="http://schemas.microsoft.com/office/drawing/2014/main" id="{6EE7E7D7-931C-C0C2-3117-AB9F8A34ADA9}"/>
+              </a:ext>
+            </a:extLst>
+          </p:cNvPr>
+          <p:cNvSpPr txBox="1"/>
+          <p:nvPr/>
+        </p:nvSpPr>
+        <p:spPr>
+          <a:xfrm>
+            <a:off x="7371347" y="1388825"/>
+            <a:ext cx="6096000" cy="369332"/>
+          </a:xfrm>
+          <a:prstGeom prst="rect">
+            <a:avLst/>
+          </a:prstGeom>
+          <a:noFill/>
+        </p:spPr>
+        <p:txBody>
+          <a:bodyPr wrap="square">
+            <a:spAutoFit/>
+          </a:bodyPr>
+          <a:lstStyle/>
+          <a:p>
+            <a:r>
+              <a:rPr lang="en-US" dirty="0"/>
+              <a:t>Chat with </a:t>
+            </a:r>
+            <a:r>
+              <a:rPr lang="en-US"/>
+              <a:t>NAVBÄR now </a:t>
+            </a:r>
+            <a:r>
+              <a:rPr lang="en-US" dirty="0">
+                <a:sym typeface="Wingdings" panose="05000000000000000000" pitchFamily="2" charset="2"/>
+              </a:rPr>
+              <a:t></a:t>
+            </a:r>
+            <a:endParaRPr lang="en-US" dirty="0"/>
+          </a:p>
+        </p:txBody>
+      </p:sp>
     </p:spTree>
     <p:extLst>
       <p:ext uri="{BB962C8B-B14F-4D97-AF65-F5344CB8AC3E}">
@@ -4406,7 +4445,28 @@
           <a:p>
             <a:r>
               <a:rPr lang="en-US" dirty="0"/>
-              <a:t>Indexed webpage and documentation to provide detailed responses to questions </a:t>
+              <a:t>Indexed webpage and documentation to provide detailed responses to questions</a:t>
+            </a:r>
+          </a:p>
+          <a:p>
+            <a:pPr lvl="1"/>
+            <a:r>
+              <a:rPr lang="en-US" dirty="0"/>
+              <a:t>Microsoft AI search</a:t>
+            </a:r>
+          </a:p>
+          <a:p>
+            <a:pPr lvl="1"/>
+            <a:r>
+              <a:rPr lang="en-US" dirty="0"/>
+              <a:t>ChatGPT 4o</a:t>
+            </a:r>
+          </a:p>
+          <a:p>
+            <a:pPr lvl="1"/>
+            <a:r>
+              <a:rPr lang="en-US" dirty="0"/>
+              <a:t>RAG</a:t>
             </a:r>
           </a:p>
           <a:p>

</xml_diff>